<commit_message>
Updated several slides in PPTx.
</commit_message>
<xml_diff>
--- a/artifacts/Stockman-Presentation.pptx
+++ b/artifacts/Stockman-Presentation.pptx
@@ -5,18 +5,19 @@
     <p:sldMasterId id="2147483659" r:id="rId1"/>
   </p:sldMasterIdLst>
   <p:notesMasterIdLst>
-    <p:notesMasterId r:id="rId11"/>
+    <p:notesMasterId r:id="rId12"/>
   </p:notesMasterIdLst>
   <p:sldIdLst>
     <p:sldId id="256" r:id="rId2"/>
     <p:sldId id="257" r:id="rId3"/>
     <p:sldId id="277" r:id="rId4"/>
     <p:sldId id="283" r:id="rId5"/>
-    <p:sldId id="278" r:id="rId6"/>
-    <p:sldId id="279" r:id="rId7"/>
-    <p:sldId id="280" r:id="rId8"/>
-    <p:sldId id="281" r:id="rId9"/>
-    <p:sldId id="282" r:id="rId10"/>
+    <p:sldId id="284" r:id="rId6"/>
+    <p:sldId id="278" r:id="rId7"/>
+    <p:sldId id="279" r:id="rId8"/>
+    <p:sldId id="280" r:id="rId9"/>
+    <p:sldId id="281" r:id="rId10"/>
+    <p:sldId id="282" r:id="rId11"/>
   </p:sldIdLst>
   <p:sldSz cx="9144000" cy="6858000" type="screen4x3"/>
   <p:notesSz cx="6858000" cy="9144000"/>
@@ -973,6 +974,160 @@
 </p:notes>
 </file>
 
+<file path=ppt/notesSlides/notesSlide10.xml><?xml version="1.0" encoding="utf-8"?>
+<p:notes xmlns:a="http://schemas.openxmlformats.org/drawingml/2006/main" xmlns:r="http://schemas.openxmlformats.org/officeDocument/2006/relationships" xmlns:p="http://schemas.openxmlformats.org/presentationml/2006/main" showMasterSp="0" showMasterPhAnim="0">
+  <p:cSld>
+    <p:spTree>
+      <p:nvGrpSpPr>
+        <p:cNvPr id="1" name="Shape 88"/>
+        <p:cNvGrpSpPr/>
+        <p:nvPr/>
+      </p:nvGrpSpPr>
+      <p:grpSpPr>
+        <a:xfrm>
+          <a:off x="0" y="0"/>
+          <a:ext cx="0" cy="0"/>
+          <a:chOff x="0" y="0"/>
+          <a:chExt cx="0" cy="0"/>
+        </a:xfrm>
+      </p:grpSpPr>
+      <p:sp>
+        <p:nvSpPr>
+          <p:cNvPr id="89" name="Google Shape;89;p2:notes"/>
+          <p:cNvSpPr txBox="1">
+            <a:spLocks noGrp="1"/>
+          </p:cNvSpPr>
+          <p:nvPr>
+            <p:ph type="body" idx="1"/>
+          </p:nvPr>
+        </p:nvSpPr>
+        <p:spPr>
+          <a:xfrm>
+            <a:off x="685800" y="4343400"/>
+            <a:ext cx="5486400" cy="4114800"/>
+          </a:xfrm>
+          <a:prstGeom prst="rect">
+            <a:avLst/>
+          </a:prstGeom>
+          <a:noFill/>
+          <a:ln>
+            <a:noFill/>
+          </a:ln>
+        </p:spPr>
+        <p:txBody>
+          <a:bodyPr spcFirstLastPara="1" wrap="square" lIns="91425" tIns="91425" rIns="91425" bIns="91425" anchor="t" anchorCtr="0">
+            <a:noAutofit/>
+          </a:bodyPr>
+          <a:lstStyle/>
+          <a:p>
+            <a:pPr marL="457200" lvl="0" indent="-317500" algn="l" rtl="0">
+              <a:lnSpc>
+                <a:spcPct val="100000"/>
+              </a:lnSpc>
+              <a:spcBef>
+                <a:spcPts val="0"/>
+              </a:spcBef>
+              <a:spcAft>
+                <a:spcPts val="0"/>
+              </a:spcAft>
+              <a:buSzPts val="1400"/>
+              <a:buFont typeface="Times New Roman"/>
+              <a:buChar char="●"/>
+            </a:pPr>
+            <a:r>
+              <a:rPr lang="en-US" sz="1400" dirty="0">
+                <a:solidFill>
+                  <a:srgbClr val="111111"/>
+                </a:solidFill>
+                <a:highlight>
+                  <a:srgbClr val="FFFFFF"/>
+                </a:highlight>
+                <a:latin typeface="Times New Roman"/>
+                <a:ea typeface="Times New Roman"/>
+                <a:cs typeface="Times New Roman"/>
+                <a:sym typeface="Times New Roman"/>
+              </a:rPr>
+              <a:t>Closing slide</a:t>
+            </a:r>
+            <a:endParaRPr sz="1400" dirty="0">
+              <a:solidFill>
+                <a:srgbClr val="111111"/>
+              </a:solidFill>
+              <a:highlight>
+                <a:srgbClr val="FFFFFF"/>
+              </a:highlight>
+              <a:latin typeface="Times New Roman"/>
+              <a:ea typeface="Times New Roman"/>
+              <a:cs typeface="Times New Roman"/>
+              <a:sym typeface="Times New Roman"/>
+            </a:endParaRPr>
+          </a:p>
+        </p:txBody>
+      </p:sp>
+      <p:sp>
+        <p:nvSpPr>
+          <p:cNvPr id="90" name="Google Shape;90;p2:notes"/>
+          <p:cNvSpPr>
+            <a:spLocks noGrp="1" noRot="1" noChangeAspect="1"/>
+          </p:cNvSpPr>
+          <p:nvPr>
+            <p:ph type="sldImg" idx="2"/>
+          </p:nvPr>
+        </p:nvSpPr>
+        <p:spPr>
+          <a:xfrm>
+            <a:off x="1143000" y="685800"/>
+            <a:ext cx="4572000" cy="3429000"/>
+          </a:xfrm>
+          <a:custGeom>
+            <a:avLst/>
+            <a:gdLst/>
+            <a:ahLst/>
+            <a:cxnLst/>
+            <a:rect l="l" t="t" r="r" b="b"/>
+            <a:pathLst>
+              <a:path w="120000" h="120000" extrusionOk="0">
+                <a:moveTo>
+                  <a:pt x="0" y="0"/>
+                </a:moveTo>
+                <a:lnTo>
+                  <a:pt x="120000" y="0"/>
+                </a:lnTo>
+                <a:lnTo>
+                  <a:pt x="120000" y="120000"/>
+                </a:lnTo>
+                <a:lnTo>
+                  <a:pt x="0" y="120000"/>
+                </a:lnTo>
+                <a:close/>
+              </a:path>
+            </a:pathLst>
+          </a:custGeom>
+          <a:noFill/>
+          <a:ln w="9525" cap="flat" cmpd="sng">
+            <a:solidFill>
+              <a:srgbClr val="000000"/>
+            </a:solidFill>
+            <a:prstDash val="solid"/>
+            <a:round/>
+            <a:headEnd type="none" w="sm" len="sm"/>
+            <a:tailEnd type="none" w="sm" len="sm"/>
+          </a:ln>
+        </p:spPr>
+      </p:sp>
+    </p:spTree>
+    <p:extLst>
+      <p:ext uri="{BB962C8B-B14F-4D97-AF65-F5344CB8AC3E}">
+        <p14:creationId xmlns:p14="http://schemas.microsoft.com/office/powerpoint/2010/main" val="651252046"/>
+      </p:ext>
+    </p:extLst>
+  </p:cSld>
+  <p:clrMapOvr>
+    <a:masterClrMapping/>
+  </p:clrMapOvr>
+</p:notes>
+</file>
+
 <file path=ppt/notesSlides/notesSlide2.xml><?xml version="1.0" encoding="utf-8"?>
 <p:notes xmlns:a="http://schemas.openxmlformats.org/drawingml/2006/main" xmlns:r="http://schemas.openxmlformats.org/officeDocument/2006/relationships" xmlns:p="http://schemas.openxmlformats.org/presentationml/2006/main" showMasterSp="0" showMasterPhAnim="0">
   <p:cSld>
@@ -1615,7 +1770,7 @@
                 <a:cs typeface="Times New Roman"/>
                 <a:sym typeface="Times New Roman"/>
               </a:rPr>
-              <a:t>The process/execution flow through the application</a:t>
+              <a:t>A description of what the application does.</a:t>
             </a:r>
           </a:p>
           <a:p>
@@ -1646,7 +1801,195 @@
                 <a:cs typeface="Times New Roman"/>
                 <a:sym typeface="Times New Roman"/>
               </a:rPr>
-              <a:t>Discuss investment specification, page updating, the use of “modals”, the APIs used.</a:t>
+              <a:t>The motivation for development</a:t>
+            </a:r>
+          </a:p>
+        </p:txBody>
+      </p:sp>
+      <p:sp>
+        <p:nvSpPr>
+          <p:cNvPr id="90" name="Google Shape;90;p2:notes"/>
+          <p:cNvSpPr>
+            <a:spLocks noGrp="1" noRot="1" noChangeAspect="1"/>
+          </p:cNvSpPr>
+          <p:nvPr>
+            <p:ph type="sldImg" idx="2"/>
+          </p:nvPr>
+        </p:nvSpPr>
+        <p:spPr>
+          <a:xfrm>
+            <a:off x="1143000" y="685800"/>
+            <a:ext cx="4572000" cy="3429000"/>
+          </a:xfrm>
+          <a:custGeom>
+            <a:avLst/>
+            <a:gdLst/>
+            <a:ahLst/>
+            <a:cxnLst/>
+            <a:rect l="l" t="t" r="r" b="b"/>
+            <a:pathLst>
+              <a:path w="120000" h="120000" extrusionOk="0">
+                <a:moveTo>
+                  <a:pt x="0" y="0"/>
+                </a:moveTo>
+                <a:lnTo>
+                  <a:pt x="120000" y="0"/>
+                </a:lnTo>
+                <a:lnTo>
+                  <a:pt x="120000" y="120000"/>
+                </a:lnTo>
+                <a:lnTo>
+                  <a:pt x="0" y="120000"/>
+                </a:lnTo>
+                <a:close/>
+              </a:path>
+            </a:pathLst>
+          </a:custGeom>
+          <a:noFill/>
+          <a:ln w="9525" cap="flat" cmpd="sng">
+            <a:solidFill>
+              <a:srgbClr val="000000"/>
+            </a:solidFill>
+            <a:prstDash val="solid"/>
+            <a:round/>
+            <a:headEnd type="none" w="sm" len="sm"/>
+            <a:tailEnd type="none" w="sm" len="sm"/>
+          </a:ln>
+        </p:spPr>
+      </p:sp>
+    </p:spTree>
+    <p:extLst>
+      <p:ext uri="{BB962C8B-B14F-4D97-AF65-F5344CB8AC3E}">
+        <p14:creationId xmlns:p14="http://schemas.microsoft.com/office/powerpoint/2010/main" val="1853202897"/>
+      </p:ext>
+    </p:extLst>
+  </p:cSld>
+  <p:clrMapOvr>
+    <a:masterClrMapping/>
+  </p:clrMapOvr>
+</p:notes>
+</file>
+
+<file path=ppt/notesSlides/notesSlide6.xml><?xml version="1.0" encoding="utf-8"?>
+<p:notes xmlns:a="http://schemas.openxmlformats.org/drawingml/2006/main" xmlns:r="http://schemas.openxmlformats.org/officeDocument/2006/relationships" xmlns:p="http://schemas.openxmlformats.org/presentationml/2006/main" showMasterSp="0" showMasterPhAnim="0">
+  <p:cSld>
+    <p:spTree>
+      <p:nvGrpSpPr>
+        <p:cNvPr id="1" name="Shape 88"/>
+        <p:cNvGrpSpPr/>
+        <p:nvPr/>
+      </p:nvGrpSpPr>
+      <p:grpSpPr>
+        <a:xfrm>
+          <a:off x="0" y="0"/>
+          <a:ext cx="0" cy="0"/>
+          <a:chOff x="0" y="0"/>
+          <a:chExt cx="0" cy="0"/>
+        </a:xfrm>
+      </p:grpSpPr>
+      <p:sp>
+        <p:nvSpPr>
+          <p:cNvPr id="89" name="Google Shape;89;p2:notes"/>
+          <p:cNvSpPr txBox="1">
+            <a:spLocks noGrp="1"/>
+          </p:cNvSpPr>
+          <p:nvPr>
+            <p:ph type="body" idx="1"/>
+          </p:nvPr>
+        </p:nvSpPr>
+        <p:spPr>
+          <a:xfrm>
+            <a:off x="685800" y="4343400"/>
+            <a:ext cx="5486400" cy="4114800"/>
+          </a:xfrm>
+          <a:prstGeom prst="rect">
+            <a:avLst/>
+          </a:prstGeom>
+          <a:noFill/>
+          <a:ln>
+            <a:noFill/>
+          </a:ln>
+        </p:spPr>
+        <p:txBody>
+          <a:bodyPr spcFirstLastPara="1" wrap="square" lIns="91425" tIns="91425" rIns="91425" bIns="91425" anchor="t" anchorCtr="0">
+            <a:noAutofit/>
+          </a:bodyPr>
+          <a:lstStyle/>
+          <a:p>
+            <a:pPr marL="457200" lvl="0" indent="-317500" algn="l" rtl="0">
+              <a:lnSpc>
+                <a:spcPct val="100000"/>
+              </a:lnSpc>
+              <a:spcBef>
+                <a:spcPts val="0"/>
+              </a:spcBef>
+              <a:spcAft>
+                <a:spcPts val="0"/>
+              </a:spcAft>
+              <a:buSzPts val="1400"/>
+              <a:buFont typeface="Times New Roman"/>
+              <a:buChar char="●"/>
+            </a:pPr>
+            <a:r>
+              <a:rPr lang="en-US" sz="1400" dirty="0">
+                <a:solidFill>
+                  <a:srgbClr val="111111"/>
+                </a:solidFill>
+                <a:highlight>
+                  <a:srgbClr val="FFFFFF"/>
+                </a:highlight>
+                <a:latin typeface="Times New Roman"/>
+                <a:ea typeface="Times New Roman"/>
+                <a:cs typeface="Times New Roman"/>
+                <a:sym typeface="Times New Roman"/>
+              </a:rPr>
+              <a:t>The process/execution flow through the application</a:t>
+            </a:r>
+          </a:p>
+          <a:p>
+            <a:pPr marL="457200" lvl="0" indent="-317500" algn="l" rtl="0">
+              <a:lnSpc>
+                <a:spcPct val="100000"/>
+              </a:lnSpc>
+              <a:spcBef>
+                <a:spcPts val="0"/>
+              </a:spcBef>
+              <a:spcAft>
+                <a:spcPts val="0"/>
+              </a:spcAft>
+              <a:buSzPts val="1400"/>
+              <a:buFont typeface="Times New Roman"/>
+              <a:buChar char="●"/>
+            </a:pPr>
+            <a:r>
+              <a:rPr lang="en-US" sz="1400" dirty="0">
+                <a:solidFill>
+                  <a:srgbClr val="111111"/>
+                </a:solidFill>
+                <a:highlight>
+                  <a:srgbClr val="FFFFFF"/>
+                </a:highlight>
+                <a:latin typeface="Times New Roman"/>
+                <a:ea typeface="Times New Roman"/>
+                <a:cs typeface="Times New Roman"/>
+                <a:sym typeface="Times New Roman"/>
+              </a:rPr>
+              <a:t>Discuss investment specification, page updating, the use of “modals”, </a:t>
+            </a:r>
+            <a:r>
+              <a:rPr lang="en-US" sz="1400">
+                <a:solidFill>
+                  <a:srgbClr val="111111"/>
+                </a:solidFill>
+                <a:highlight>
+                  <a:srgbClr val="FFFFFF"/>
+                </a:highlight>
+                <a:latin typeface="Times New Roman"/>
+                <a:ea typeface="Times New Roman"/>
+                <a:cs typeface="Times New Roman"/>
+                <a:sym typeface="Times New Roman"/>
+              </a:rPr>
+              <a:t>other behavior.</a:t>
             </a:r>
             <a:endParaRPr sz="1400" dirty="0">
               <a:solidFill>
@@ -1727,7 +2070,7 @@
 </p:notes>
 </file>
 
-<file path=ppt/notesSlides/notesSlide6.xml><?xml version="1.0" encoding="utf-8"?>
+<file path=ppt/notesSlides/notesSlide7.xml><?xml version="1.0" encoding="utf-8"?>
 <p:notes xmlns:a="http://schemas.openxmlformats.org/drawingml/2006/main" xmlns:r="http://schemas.openxmlformats.org/officeDocument/2006/relationships" xmlns:p="http://schemas.openxmlformats.org/presentationml/2006/main" showMasterSp="0" showMasterPhAnim="0">
   <p:cSld>
     <p:spTree>
@@ -1912,7 +2255,7 @@
 </p:notes>
 </file>
 
-<file path=ppt/notesSlides/notesSlide7.xml><?xml version="1.0" encoding="utf-8"?>
+<file path=ppt/notesSlides/notesSlide8.xml><?xml version="1.0" encoding="utf-8"?>
 <p:notes xmlns:a="http://schemas.openxmlformats.org/drawingml/2006/main" xmlns:r="http://schemas.openxmlformats.org/officeDocument/2006/relationships" xmlns:p="http://schemas.openxmlformats.org/presentationml/2006/main" showMasterSp="0" showMasterPhAnim="0">
   <p:cSld>
     <p:spTree>
@@ -2066,7 +2409,7 @@
 </p:notes>
 </file>
 
-<file path=ppt/notesSlides/notesSlide8.xml><?xml version="1.0" encoding="utf-8"?>
+<file path=ppt/notesSlides/notesSlide9.xml><?xml version="1.0" encoding="utf-8"?>
 <p:notes xmlns:a="http://schemas.openxmlformats.org/drawingml/2006/main" xmlns:r="http://schemas.openxmlformats.org/officeDocument/2006/relationships" xmlns:p="http://schemas.openxmlformats.org/presentationml/2006/main" showMasterSp="0" showMasterPhAnim="0">
   <p:cSld>
     <p:spTree>
@@ -2211,160 +2554,6 @@
     <p:extLst>
       <p:ext uri="{BB962C8B-B14F-4D97-AF65-F5344CB8AC3E}">
         <p14:creationId xmlns:p14="http://schemas.microsoft.com/office/powerpoint/2010/main" val="2257832530"/>
-      </p:ext>
-    </p:extLst>
-  </p:cSld>
-  <p:clrMapOvr>
-    <a:masterClrMapping/>
-  </p:clrMapOvr>
-</p:notes>
-</file>
-
-<file path=ppt/notesSlides/notesSlide9.xml><?xml version="1.0" encoding="utf-8"?>
-<p:notes xmlns:a="http://schemas.openxmlformats.org/drawingml/2006/main" xmlns:r="http://schemas.openxmlformats.org/officeDocument/2006/relationships" xmlns:p="http://schemas.openxmlformats.org/presentationml/2006/main" showMasterSp="0" showMasterPhAnim="0">
-  <p:cSld>
-    <p:spTree>
-      <p:nvGrpSpPr>
-        <p:cNvPr id="1" name="Shape 88"/>
-        <p:cNvGrpSpPr/>
-        <p:nvPr/>
-      </p:nvGrpSpPr>
-      <p:grpSpPr>
-        <a:xfrm>
-          <a:off x="0" y="0"/>
-          <a:ext cx="0" cy="0"/>
-          <a:chOff x="0" y="0"/>
-          <a:chExt cx="0" cy="0"/>
-        </a:xfrm>
-      </p:grpSpPr>
-      <p:sp>
-        <p:nvSpPr>
-          <p:cNvPr id="89" name="Google Shape;89;p2:notes"/>
-          <p:cNvSpPr txBox="1">
-            <a:spLocks noGrp="1"/>
-          </p:cNvSpPr>
-          <p:nvPr>
-            <p:ph type="body" idx="1"/>
-          </p:nvPr>
-        </p:nvSpPr>
-        <p:spPr>
-          <a:xfrm>
-            <a:off x="685800" y="4343400"/>
-            <a:ext cx="5486400" cy="4114800"/>
-          </a:xfrm>
-          <a:prstGeom prst="rect">
-            <a:avLst/>
-          </a:prstGeom>
-          <a:noFill/>
-          <a:ln>
-            <a:noFill/>
-          </a:ln>
-        </p:spPr>
-        <p:txBody>
-          <a:bodyPr spcFirstLastPara="1" wrap="square" lIns="91425" tIns="91425" rIns="91425" bIns="91425" anchor="t" anchorCtr="0">
-            <a:noAutofit/>
-          </a:bodyPr>
-          <a:lstStyle/>
-          <a:p>
-            <a:pPr marL="457200" lvl="0" indent="-317500" algn="l" rtl="0">
-              <a:lnSpc>
-                <a:spcPct val="100000"/>
-              </a:lnSpc>
-              <a:spcBef>
-                <a:spcPts val="0"/>
-              </a:spcBef>
-              <a:spcAft>
-                <a:spcPts val="0"/>
-              </a:spcAft>
-              <a:buSzPts val="1400"/>
-              <a:buFont typeface="Times New Roman"/>
-              <a:buChar char="●"/>
-            </a:pPr>
-            <a:r>
-              <a:rPr lang="en-US" sz="1400" dirty="0">
-                <a:solidFill>
-                  <a:srgbClr val="111111"/>
-                </a:solidFill>
-                <a:highlight>
-                  <a:srgbClr val="FFFFFF"/>
-                </a:highlight>
-                <a:latin typeface="Times New Roman"/>
-                <a:ea typeface="Times New Roman"/>
-                <a:cs typeface="Times New Roman"/>
-                <a:sym typeface="Times New Roman"/>
-              </a:rPr>
-              <a:t>Closing slide</a:t>
-            </a:r>
-            <a:endParaRPr sz="1400" dirty="0">
-              <a:solidFill>
-                <a:srgbClr val="111111"/>
-              </a:solidFill>
-              <a:highlight>
-                <a:srgbClr val="FFFFFF"/>
-              </a:highlight>
-              <a:latin typeface="Times New Roman"/>
-              <a:ea typeface="Times New Roman"/>
-              <a:cs typeface="Times New Roman"/>
-              <a:sym typeface="Times New Roman"/>
-            </a:endParaRPr>
-          </a:p>
-        </p:txBody>
-      </p:sp>
-      <p:sp>
-        <p:nvSpPr>
-          <p:cNvPr id="90" name="Google Shape;90;p2:notes"/>
-          <p:cNvSpPr>
-            <a:spLocks noGrp="1" noRot="1" noChangeAspect="1"/>
-          </p:cNvSpPr>
-          <p:nvPr>
-            <p:ph type="sldImg" idx="2"/>
-          </p:nvPr>
-        </p:nvSpPr>
-        <p:spPr>
-          <a:xfrm>
-            <a:off x="1143000" y="685800"/>
-            <a:ext cx="4572000" cy="3429000"/>
-          </a:xfrm>
-          <a:custGeom>
-            <a:avLst/>
-            <a:gdLst/>
-            <a:ahLst/>
-            <a:cxnLst/>
-            <a:rect l="l" t="t" r="r" b="b"/>
-            <a:pathLst>
-              <a:path w="120000" h="120000" extrusionOk="0">
-                <a:moveTo>
-                  <a:pt x="0" y="0"/>
-                </a:moveTo>
-                <a:lnTo>
-                  <a:pt x="120000" y="0"/>
-                </a:lnTo>
-                <a:lnTo>
-                  <a:pt x="120000" y="120000"/>
-                </a:lnTo>
-                <a:lnTo>
-                  <a:pt x="0" y="120000"/>
-                </a:lnTo>
-                <a:close/>
-              </a:path>
-            </a:pathLst>
-          </a:custGeom>
-          <a:noFill/>
-          <a:ln w="9525" cap="flat" cmpd="sng">
-            <a:solidFill>
-              <a:srgbClr val="000000"/>
-            </a:solidFill>
-            <a:prstDash val="solid"/>
-            <a:round/>
-            <a:headEnd type="none" w="sm" len="sm"/>
-            <a:tailEnd type="none" w="sm" len="sm"/>
-          </a:ln>
-        </p:spPr>
-      </p:sp>
-    </p:spTree>
-    <p:extLst>
-      <p:ext uri="{BB962C8B-B14F-4D97-AF65-F5344CB8AC3E}">
-        <p14:creationId xmlns:p14="http://schemas.microsoft.com/office/powerpoint/2010/main" val="651252046"/>
       </p:ext>
     </p:extLst>
   </p:cSld>
@@ -14844,11 +15033,366 @@
   <p:clrMapOvr>
     <a:masterClrMapping/>
   </p:clrMapOvr>
-  <mc:AlternateContent xmlns:mc="http://schemas.openxmlformats.org/markup-compatibility/2006">
-    <mc:Choice xmlns:p14="http://schemas.microsoft.com/office/powerpoint/2010/main" Requires="p14">
+  <mc:AlternateContent xmlns:mc="http://schemas.openxmlformats.org/markup-compatibility/2006" xmlns:p14="http://schemas.microsoft.com/office/powerpoint/2010/main">
+    <mc:Choice Requires="p14">
       <p:transition spd="slow" p14:dur="2000" advClick="0"/>
     </mc:Choice>
-    <mc:Fallback>
+    <mc:Fallback xmlns="">
+      <p:transition spd="slow" advClick="0"/>
+    </mc:Fallback>
+  </mc:AlternateContent>
+</p:sld>
+</file>
+
+<file path=ppt/slides/slide10.xml><?xml version="1.0" encoding="utf-8"?>
+<p:sld xmlns:a="http://schemas.openxmlformats.org/drawingml/2006/main" xmlns:r="http://schemas.openxmlformats.org/officeDocument/2006/relationships" xmlns:p="http://schemas.openxmlformats.org/presentationml/2006/main">
+  <p:cSld>
+    <p:spTree>
+      <p:nvGrpSpPr>
+        <p:cNvPr id="1" name="Shape 91"/>
+        <p:cNvGrpSpPr/>
+        <p:nvPr/>
+      </p:nvGrpSpPr>
+      <p:grpSpPr>
+        <a:xfrm>
+          <a:off x="0" y="0"/>
+          <a:ext cx="0" cy="0"/>
+          <a:chOff x="0" y="0"/>
+          <a:chExt cx="0" cy="0"/>
+        </a:xfrm>
+      </p:grpSpPr>
+      <p:sp>
+        <p:nvSpPr>
+          <p:cNvPr id="92" name="Google Shape;92;p14"/>
+          <p:cNvSpPr txBox="1">
+            <a:spLocks noGrp="1"/>
+          </p:cNvSpPr>
+          <p:nvPr>
+            <p:ph type="ctrTitle"/>
+          </p:nvPr>
+        </p:nvSpPr>
+        <p:spPr>
+          <a:xfrm>
+            <a:off x="457200" y="76200"/>
+            <a:ext cx="8305800" cy="1470025"/>
+          </a:xfrm>
+          <a:prstGeom prst="rect">
+            <a:avLst/>
+          </a:prstGeom>
+          <a:solidFill>
+            <a:srgbClr val="C96009"/>
+          </a:solidFill>
+          <a:ln/>
+        </p:spPr>
+        <p:style>
+          <a:lnRef idx="2">
+            <a:schemeClr val="accent6">
+              <a:shade val="50000"/>
+            </a:schemeClr>
+          </a:lnRef>
+          <a:fillRef idx="1">
+            <a:schemeClr val="accent6"/>
+          </a:fillRef>
+          <a:effectRef idx="0">
+            <a:schemeClr val="accent6"/>
+          </a:effectRef>
+          <a:fontRef idx="minor">
+            <a:schemeClr val="lt1"/>
+          </a:fontRef>
+        </p:style>
+        <p:txBody>
+          <a:bodyPr spcFirstLastPara="1" wrap="square" lIns="91425" tIns="45700" rIns="91425" bIns="45700" anchor="ctr" anchorCtr="0">
+            <a:noAutofit/>
+          </a:bodyPr>
+          <a:lstStyle/>
+          <a:p>
+            <a:pPr marL="0" lvl="0" indent="0" algn="l" rtl="0">
+              <a:lnSpc>
+                <a:spcPct val="100000"/>
+              </a:lnSpc>
+              <a:spcBef>
+                <a:spcPts val="0"/>
+              </a:spcBef>
+              <a:spcAft>
+                <a:spcPts val="0"/>
+              </a:spcAft>
+              <a:buClr>
+                <a:schemeClr val="lt1"/>
+              </a:buClr>
+              <a:buSzPts val="4800"/>
+              <a:buFont typeface="Calibri"/>
+              <a:buNone/>
+            </a:pPr>
+            <a:r>
+              <a:rPr lang="en-US" b="1" dirty="0">
+                <a:solidFill>
+                  <a:schemeClr val="lt1"/>
+                </a:solidFill>
+              </a:rPr>
+              <a:t>Stockman – </a:t>
+            </a:r>
+            <a:r>
+              <a:rPr lang="en-US" sz="3600" b="1" dirty="0">
+                <a:solidFill>
+                  <a:schemeClr val="lt1"/>
+                </a:solidFill>
+              </a:rPr>
+              <a:t>Questions</a:t>
+            </a:r>
+            <a:endParaRPr sz="3600" dirty="0"/>
+          </a:p>
+        </p:txBody>
+      </p:sp>
+      <p:sp>
+        <p:nvSpPr>
+          <p:cNvPr id="93" name="Google Shape;93;p14"/>
+          <p:cNvSpPr txBox="1">
+            <a:spLocks noGrp="1"/>
+          </p:cNvSpPr>
+          <p:nvPr>
+            <p:ph type="subTitle" idx="1"/>
+          </p:nvPr>
+        </p:nvSpPr>
+        <p:spPr>
+          <a:xfrm>
+            <a:off x="457200" y="1676400"/>
+            <a:ext cx="8305800" cy="4876800"/>
+          </a:xfrm>
+          <a:prstGeom prst="rect">
+            <a:avLst/>
+          </a:prstGeom>
+          <a:noFill/>
+          <a:ln>
+            <a:noFill/>
+          </a:ln>
+        </p:spPr>
+        <p:txBody>
+          <a:bodyPr spcFirstLastPara="1" wrap="square" lIns="91425" tIns="45700" rIns="91425" bIns="45700" anchor="t" anchorCtr="0">
+            <a:noAutofit/>
+          </a:bodyPr>
+          <a:lstStyle/>
+          <a:p>
+            <a:pPr marL="0" lvl="0" indent="0" algn="ctr" rtl="0">
+              <a:lnSpc>
+                <a:spcPct val="100000"/>
+              </a:lnSpc>
+              <a:spcBef>
+                <a:spcPts val="0"/>
+              </a:spcBef>
+              <a:spcAft>
+                <a:spcPts val="0"/>
+              </a:spcAft>
+              <a:buClr>
+                <a:srgbClr val="888888"/>
+              </a:buClr>
+              <a:buSzPts val="3200"/>
+              <a:buNone/>
+            </a:pPr>
+            <a:endParaRPr dirty="0"/>
+          </a:p>
+          <a:p>
+            <a:pPr marL="0" lvl="0" indent="0" algn="ctr" rtl="0">
+              <a:lnSpc>
+                <a:spcPct val="100000"/>
+              </a:lnSpc>
+              <a:spcBef>
+                <a:spcPts val="0"/>
+              </a:spcBef>
+              <a:spcAft>
+                <a:spcPts val="0"/>
+              </a:spcAft>
+              <a:buClr>
+                <a:srgbClr val="888888"/>
+              </a:buClr>
+              <a:buSzPts val="3200"/>
+              <a:buNone/>
+            </a:pPr>
+            <a:endParaRPr dirty="0"/>
+          </a:p>
+          <a:p>
+            <a:pPr marL="0" lvl="0" indent="0" algn="ctr" rtl="0">
+              <a:lnSpc>
+                <a:spcPct val="100000"/>
+              </a:lnSpc>
+              <a:spcBef>
+                <a:spcPts val="0"/>
+              </a:spcBef>
+              <a:spcAft>
+                <a:spcPts val="0"/>
+              </a:spcAft>
+              <a:buClr>
+                <a:srgbClr val="888888"/>
+              </a:buClr>
+              <a:buSzPts val="3200"/>
+              <a:buNone/>
+            </a:pPr>
+            <a:endParaRPr dirty="0"/>
+          </a:p>
+          <a:p>
+            <a:pPr marL="0" lvl="0" indent="0" algn="ctr" rtl="0">
+              <a:lnSpc>
+                <a:spcPct val="100000"/>
+              </a:lnSpc>
+              <a:spcBef>
+                <a:spcPts val="0"/>
+              </a:spcBef>
+              <a:spcAft>
+                <a:spcPts val="0"/>
+              </a:spcAft>
+              <a:buClr>
+                <a:srgbClr val="888888"/>
+              </a:buClr>
+              <a:buSzPts val="3200"/>
+              <a:buNone/>
+            </a:pPr>
+            <a:endParaRPr dirty="0"/>
+          </a:p>
+        </p:txBody>
+      </p:sp>
+      <p:sp>
+        <p:nvSpPr>
+          <p:cNvPr id="94" name="Google Shape;94;p14"/>
+          <p:cNvSpPr txBox="1"/>
+          <p:nvPr/>
+        </p:nvSpPr>
+        <p:spPr>
+          <a:xfrm>
+            <a:off x="380999" y="1912883"/>
+            <a:ext cx="4762501" cy="1664708"/>
+          </a:xfrm>
+          <a:prstGeom prst="rect">
+            <a:avLst/>
+          </a:prstGeom>
+          <a:noFill/>
+          <a:ln>
+            <a:noFill/>
+          </a:ln>
+        </p:spPr>
+        <p:txBody>
+          <a:bodyPr spcFirstLastPara="1" wrap="square" lIns="91425" tIns="45700" rIns="91425" bIns="45700" anchor="t" anchorCtr="0">
+            <a:noAutofit/>
+          </a:bodyPr>
+          <a:lstStyle/>
+          <a:p>
+            <a:pPr marL="285750" marR="0" lvl="0" indent="-285750" algn="l" rtl="0">
+              <a:lnSpc>
+                <a:spcPct val="200000"/>
+              </a:lnSpc>
+              <a:spcBef>
+                <a:spcPts val="0"/>
+              </a:spcBef>
+              <a:spcAft>
+                <a:spcPts val="0"/>
+              </a:spcAft>
+              <a:buClr>
+                <a:srgbClr val="000000"/>
+              </a:buClr>
+              <a:buSzPts val="2800"/>
+              <a:buFont typeface="Wingdings" panose="05000000000000000000" pitchFamily="2" charset="2"/>
+              <a:buChar char="§"/>
+            </a:pPr>
+            <a:r>
+              <a:rPr lang="en-US" sz="1800" dirty="0"/>
+              <a:t>Thank you for watching this presentation.</a:t>
+            </a:r>
+          </a:p>
+          <a:p>
+            <a:pPr marL="285750" lvl="3">
+              <a:buSzPts val="2800"/>
+            </a:pPr>
+            <a:br>
+              <a:rPr lang="en-US" sz="1800" dirty="0"/>
+            </a:br>
+            <a:endParaRPr lang="en-US" sz="1800" dirty="0"/>
+          </a:p>
+          <a:p>
+            <a:pPr marL="285750" indent="-285750">
+              <a:lnSpc>
+                <a:spcPct val="200000"/>
+              </a:lnSpc>
+              <a:buSzPts val="2800"/>
+              <a:buFont typeface="Wingdings" panose="05000000000000000000" pitchFamily="2" charset="2"/>
+              <a:buChar char="§"/>
+            </a:pPr>
+            <a:r>
+              <a:rPr lang="en-US" sz="1800" dirty="0"/>
+              <a:t>Questions ?</a:t>
+            </a:r>
+            <a:endParaRPr lang="en-US" dirty="0"/>
+          </a:p>
+          <a:p>
+            <a:pPr marL="285750" lvl="1">
+              <a:lnSpc>
+                <a:spcPct val="200000"/>
+              </a:lnSpc>
+              <a:buSzPts val="2800"/>
+            </a:pPr>
+            <a:endParaRPr dirty="0"/>
+          </a:p>
+        </p:txBody>
+      </p:sp>
+      <p:pic>
+        <p:nvPicPr>
+          <p:cNvPr id="2054" name="Picture 6" descr="Free Question Mark Emoji Png, Download Free Clip Art, Free Clip Art on  Clipart Library">
+            <a:extLst>
+              <a:ext uri="{FF2B5EF4-FFF2-40B4-BE49-F238E27FC236}">
+                <a16:creationId xmlns:a16="http://schemas.microsoft.com/office/drawing/2014/main" id="{2B6F8239-4EB6-44D1-9B45-2C378A2A8344}"/>
+              </a:ext>
+            </a:extLst>
+          </p:cNvPr>
+          <p:cNvPicPr>
+            <a:picLocks noChangeAspect="1" noChangeArrowheads="1"/>
+          </p:cNvPicPr>
+          <p:nvPr/>
+        </p:nvPicPr>
+        <p:blipFill>
+          <a:blip r:embed="rId3">
+            <a:extLst>
+              <a:ext uri="{28A0092B-C50C-407E-A947-70E740481C1C}">
+                <a14:useLocalDpi xmlns:a14="http://schemas.microsoft.com/office/drawing/2010/main" val="0"/>
+              </a:ext>
+            </a:extLst>
+          </a:blip>
+          <a:srcRect/>
+          <a:stretch>
+            <a:fillRect/>
+          </a:stretch>
+        </p:blipFill>
+        <p:spPr bwMode="auto">
+          <a:xfrm>
+            <a:off x="3607434" y="3022282"/>
+            <a:ext cx="3345815" cy="3345815"/>
+          </a:xfrm>
+          <a:prstGeom prst="rect">
+            <a:avLst/>
+          </a:prstGeom>
+          <a:noFill/>
+          <a:extLst>
+            <a:ext uri="{909E8E84-426E-40DD-AFC4-6F175D3DCCD1}">
+              <a14:hiddenFill xmlns:a14="http://schemas.microsoft.com/office/drawing/2010/main">
+                <a:solidFill>
+                  <a:srgbClr val="FFFFFF"/>
+                </a:solidFill>
+              </a14:hiddenFill>
+            </a:ext>
+          </a:extLst>
+        </p:spPr>
+      </p:pic>
+    </p:spTree>
+    <p:extLst>
+      <p:ext uri="{BB962C8B-B14F-4D97-AF65-F5344CB8AC3E}">
+        <p14:creationId xmlns:p14="http://schemas.microsoft.com/office/powerpoint/2010/main" val="907269978"/>
+      </p:ext>
+    </p:extLst>
+  </p:cSld>
+  <p:clrMapOvr>
+    <a:masterClrMapping/>
+  </p:clrMapOvr>
+  <mc:AlternateContent xmlns:mc="http://schemas.openxmlformats.org/markup-compatibility/2006" xmlns:p14="http://schemas.microsoft.com/office/powerpoint/2010/main">
+    <mc:Choice Requires="p14">
+      <p:transition spd="slow" p14:dur="2000" advClick="0"/>
+    </mc:Choice>
+    <mc:Fallback xmlns="">
       <p:transition spd="slow" advClick="0"/>
     </mc:Fallback>
   </mc:AlternateContent>
@@ -15324,11 +15868,11 @@
   <p:clrMapOvr>
     <a:masterClrMapping/>
   </p:clrMapOvr>
-  <mc:AlternateContent xmlns:mc="http://schemas.openxmlformats.org/markup-compatibility/2006">
-    <mc:Choice xmlns:p14="http://schemas.microsoft.com/office/powerpoint/2010/main" Requires="p14">
+  <mc:AlternateContent xmlns:mc="http://schemas.openxmlformats.org/markup-compatibility/2006" xmlns:p14="http://schemas.microsoft.com/office/powerpoint/2010/main">
+    <mc:Choice Requires="p14">
       <p:transition spd="slow" p14:dur="2000" advClick="0"/>
     </mc:Choice>
-    <mc:Fallback>
+    <mc:Fallback xmlns="">
       <p:transition spd="slow" advClick="0"/>
     </mc:Fallback>
   </mc:AlternateContent>
@@ -15619,11 +16163,11 @@
   <p:clrMapOvr>
     <a:masterClrMapping/>
   </p:clrMapOvr>
-  <mc:AlternateContent xmlns:mc="http://schemas.openxmlformats.org/markup-compatibility/2006">
-    <mc:Choice xmlns:p14="http://schemas.microsoft.com/office/powerpoint/2010/main" Requires="p14">
+  <mc:AlternateContent xmlns:mc="http://schemas.openxmlformats.org/markup-compatibility/2006" xmlns:p14="http://schemas.microsoft.com/office/powerpoint/2010/main">
+    <mc:Choice Requires="p14">
       <p:transition spd="slow" p14:dur="2000" advClick="0"/>
     </mc:Choice>
-    <mc:Fallback>
+    <mc:Fallback xmlns="">
       <p:transition spd="slow" advClick="0"/>
     </mc:Fallback>
   </mc:AlternateContent>
@@ -16048,11 +16592,11 @@
   <p:clrMapOvr>
     <a:masterClrMapping/>
   </p:clrMapOvr>
-  <mc:AlternateContent xmlns:mc="http://schemas.openxmlformats.org/markup-compatibility/2006">
-    <mc:Choice xmlns:p14="http://schemas.microsoft.com/office/powerpoint/2010/main" Requires="p14">
+  <mc:AlternateContent xmlns:mc="http://schemas.openxmlformats.org/markup-compatibility/2006" xmlns:p14="http://schemas.microsoft.com/office/powerpoint/2010/main">
+    <mc:Choice Requires="p14">
       <p:transition spd="slow" p14:dur="2000" advClick="0"/>
     </mc:Choice>
-    <mc:Fallback>
+    <mc:Fallback xmlns="">
       <p:transition spd="slow" advClick="0"/>
     </mc:Fallback>
   </mc:AlternateContent>
@@ -16152,7 +16696,7 @@
                   <a:schemeClr val="lt1"/>
                 </a:solidFill>
               </a:rPr>
-              <a:t>Application Details</a:t>
+              <a:t>Processes, Tasks, Challenges, and Successes</a:t>
             </a:r>
             <a:endParaRPr sz="3600" dirty="0"/>
           </a:p>
@@ -16273,7 +16817,7 @@
         <p:spPr>
           <a:xfrm>
             <a:off x="380999" y="1912882"/>
-            <a:ext cx="6240137" cy="4498935"/>
+            <a:ext cx="8382001" cy="4498935"/>
           </a:xfrm>
           <a:prstGeom prst="rect">
             <a:avLst/>
@@ -16290,9 +16834,6 @@
           <a:lstStyle/>
           <a:p>
             <a:pPr marL="285750" marR="0" lvl="0" indent="-285750" algn="l" rtl="0">
-              <a:lnSpc>
-                <a:spcPct val="200000"/>
-              </a:lnSpc>
               <a:spcBef>
                 <a:spcPts val="0"/>
               </a:spcBef>
@@ -16307,12 +16848,24 @@
               <a:buChar char="§"/>
             </a:pPr>
             <a:r>
+              <a:rPr lang="en-US" sz="1600" dirty="0"/>
+              <a:t>The ‘</a:t>
+            </a:r>
+            <a:r>
               <a:rPr lang="en-US" sz="1600" dirty="0" err="1"/>
-              <a:t>asdfdfd</a:t>
+              <a:t>Bulma</a:t>
             </a:r>
             <a:r>
               <a:rPr lang="en-US" sz="1600" dirty="0"/>
-              <a:t>.</a:t>
+              <a:t>’ framework, as well as ‘</a:t>
+            </a:r>
+            <a:r>
+              <a:rPr lang="en-US" sz="1600" dirty="0" err="1"/>
+              <a:t>Fontawesome</a:t>
+            </a:r>
+            <a:r>
+              <a:rPr lang="en-US" sz="1600" dirty="0"/>
+              <a:t>’ and ‘moment.js’ are used the application’s browser presentation.</a:t>
             </a:r>
           </a:p>
           <a:p>
@@ -16324,46 +16877,15 @@
             <a:endParaRPr lang="en-US" dirty="0"/>
           </a:p>
           <a:p>
-            <a:pPr marL="571500" lvl="3" indent="-285750">
-              <a:buSzPts val="2800"/>
-              <a:buFont typeface="Arial" panose="020B0604020202020204" pitchFamily="34" charset="0"/>
-              <a:buChar char="•"/>
-            </a:pPr>
-            <a:r>
-              <a:rPr lang="en-US" dirty="0" err="1"/>
-              <a:t>adfdfd</a:t>
-            </a:r>
-            <a:r>
-              <a:rPr lang="en-US" dirty="0"/>
-              <a:t>.</a:t>
-            </a:r>
-          </a:p>
-          <a:p>
-            <a:pPr marL="571500" lvl="3" indent="-285750">
-              <a:buSzPts val="2800"/>
-              <a:buFont typeface="Arial" panose="020B0604020202020204" pitchFamily="34" charset="0"/>
-              <a:buChar char="•"/>
-            </a:pPr>
-            <a:r>
-              <a:rPr lang="en-US" dirty="0" err="1"/>
-              <a:t>dffdf</a:t>
-            </a:r>
-            <a:endParaRPr lang="en-US" dirty="0"/>
-          </a:p>
-          <a:p>
             <a:pPr marL="285750" indent="-285750">
-              <a:lnSpc>
-                <a:spcPct val="200000"/>
-              </a:lnSpc>
               <a:buSzPts val="2800"/>
               <a:buFont typeface="Wingdings" panose="05000000000000000000" pitchFamily="2" charset="2"/>
               <a:buChar char="§"/>
             </a:pPr>
             <a:r>
-              <a:rPr lang="en-US" sz="1600" dirty="0" err="1"/>
-              <a:t>adfdfdf</a:t>
+              <a:rPr lang="en-US" sz="1600" dirty="0"/>
+              <a:t>A number of API endpoints are used to acquire the necessary investment data:</a:t>
             </a:r>
-            <a:endParaRPr lang="en-US" sz="1600" dirty="0"/>
           </a:p>
           <a:p>
             <a:pPr marL="571500" lvl="1" indent="-285750">
@@ -16380,10 +16902,9 @@
               <a:buChar char="•"/>
             </a:pPr>
             <a:r>
-              <a:rPr lang="en-US" dirty="0" err="1"/>
-              <a:t>adfdfd</a:t>
+              <a:rPr lang="en-US" dirty="0"/>
+              <a:t>- AlphaAdvantage.co		- Finnhub.io</a:t>
             </a:r>
-            <a:endParaRPr lang="en-US" dirty="0"/>
           </a:p>
           <a:p>
             <a:pPr marL="571500" lvl="1" indent="-285750">
@@ -16392,28 +16913,39 @@
               <a:buChar char="•"/>
             </a:pPr>
             <a:r>
-              <a:rPr lang="en-US" dirty="0" err="1"/>
-              <a:t>adfdf</a:t>
+              <a:rPr lang="en-US" dirty="0"/>
+              <a:t>- FinancialModelingPrep.com	- nomics.com</a:t>
             </a:r>
-            <a:r>
+            <a:br>
               <a:rPr lang="en-US" dirty="0"/>
-              <a:t>.</a:t>
-            </a:r>
+            </a:br>
+            <a:endParaRPr lang="en-US" dirty="0"/>
           </a:p>
           <a:p>
             <a:pPr marL="285750" indent="-285750">
-              <a:lnSpc>
-                <a:spcPct val="200000"/>
-              </a:lnSpc>
               <a:buSzPts val="2800"/>
               <a:buFont typeface="Wingdings" panose="05000000000000000000" pitchFamily="2" charset="2"/>
               <a:buChar char="§"/>
             </a:pPr>
             <a:r>
-              <a:rPr lang="en-US" sz="1600" dirty="0" err="1"/>
-              <a:t>adfdfdff</a:t>
+              <a:rPr lang="en-US" sz="1600" dirty="0"/>
+              <a:t>Project roles: Tony &amp; Rich worked on each project component together.  We did individually initiate different parts of the project: (Tony – HTML &amp; CSS, Rich – JavaScript, Git Issues, and documentation).</a:t>
             </a:r>
+            <a:br>
+              <a:rPr lang="en-US" sz="1600" dirty="0"/>
+            </a:br>
             <a:endParaRPr lang="en-US" sz="1600" dirty="0"/>
+          </a:p>
+          <a:p>
+            <a:pPr marL="285750" indent="-285750">
+              <a:buSzPts val="2800"/>
+              <a:buFont typeface="Wingdings" panose="05000000000000000000" pitchFamily="2" charset="2"/>
+              <a:buChar char="§"/>
+            </a:pPr>
+            <a:r>
+              <a:rPr lang="en-US" sz="1600" dirty="0"/>
+              <a:t>Challenges &amp; Success:</a:t>
+            </a:r>
           </a:p>
           <a:p>
             <a:pPr marL="571500" lvl="1" indent="-285750">
@@ -16430,10 +16962,9 @@
               <a:buChar char="•"/>
             </a:pPr>
             <a:r>
-              <a:rPr lang="en-US" dirty="0" err="1"/>
-              <a:t>adfdfdfd</a:t>
+              <a:rPr lang="en-US" dirty="0"/>
+              <a:t>Some API-endpoints limit the number of uses (per-minute and per-day). Logic changes avoid this limitation.</a:t>
             </a:r>
-            <a:endParaRPr lang="en-US" dirty="0"/>
           </a:p>
           <a:p>
             <a:pPr marL="571500" lvl="1" indent="-285750">
@@ -16442,10 +16973,9 @@
               <a:buChar char="•"/>
             </a:pPr>
             <a:r>
-              <a:rPr lang="en-US" dirty="0" err="1"/>
-              <a:t>adfdfdfd</a:t>
+              <a:rPr lang="en-US" dirty="0"/>
+              <a:t>Not all API-endpoints provide all of the desired data needed.</a:t>
             </a:r>
-            <a:endParaRPr lang="en-US" dirty="0"/>
           </a:p>
           <a:p>
             <a:pPr marL="571500" lvl="1" indent="-285750">
@@ -16454,25 +16984,9 @@
               <a:buChar char="•"/>
             </a:pPr>
             <a:r>
-              <a:rPr lang="en-US" dirty="0" err="1"/>
-              <a:t>adffdfd</a:t>
+              <a:rPr lang="en-US" dirty="0"/>
+              <a:t>Nuances of certain features/functions slowed development: promise chaining, number formatting, and numeric object names </a:t>
             </a:r>
-            <a:r>
-              <a:rPr lang="en-US" dirty="0"/>
-              <a:t>,</a:t>
-            </a:r>
-          </a:p>
-          <a:p>
-            <a:pPr marL="571500" lvl="1" indent="-285750">
-              <a:buSzPts val="2800"/>
-              <a:buFont typeface="Arial" panose="020B0604020202020204" pitchFamily="34" charset="0"/>
-              <a:buChar char="•"/>
-            </a:pPr>
-            <a:r>
-              <a:rPr lang="en-US" dirty="0" err="1"/>
-              <a:t>adfdfd</a:t>
-            </a:r>
-            <a:endParaRPr lang="en-US" dirty="0"/>
           </a:p>
           <a:p>
             <a:pPr marL="285750" lvl="1">
@@ -16488,7 +17002,7 @@
     </p:spTree>
     <p:extLst>
       <p:ext uri="{BB962C8B-B14F-4D97-AF65-F5344CB8AC3E}">
-        <p14:creationId xmlns:p14="http://schemas.microsoft.com/office/powerpoint/2010/main" val="4128781678"/>
+        <p14:creationId xmlns:p14="http://schemas.microsoft.com/office/powerpoint/2010/main" val="4172975572"/>
       </p:ext>
     </p:extLst>
   </p:cSld>
@@ -16599,7 +17113,7 @@
                   <a:schemeClr val="lt1"/>
                 </a:solidFill>
               </a:rPr>
-              <a:t>Application Demonstration</a:t>
+              <a:t>Application Details</a:t>
             </a:r>
             <a:endParaRPr sz="3600" dirty="0"/>
           </a:p>
@@ -16720,7 +17234,7 @@
         <p:spPr>
           <a:xfrm>
             <a:off x="380999" y="1912882"/>
-            <a:ext cx="6240137" cy="4498935"/>
+            <a:ext cx="8382001" cy="4498935"/>
           </a:xfrm>
           <a:prstGeom prst="rect">
             <a:avLst/>
@@ -16738,7 +17252,7 @@
           <a:p>
             <a:pPr marL="285750" marR="0" lvl="0" indent="-285750" algn="l" rtl="0">
               <a:lnSpc>
-                <a:spcPct val="200000"/>
+                <a:spcPct val="150000"/>
               </a:lnSpc>
               <a:spcBef>
                 <a:spcPts val="0"/>
@@ -16755,9 +17269,123 @@
             </a:pPr>
             <a:r>
               <a:rPr lang="en-US" sz="1600" dirty="0"/>
-              <a:t>The demonstration:</a:t>
+              <a:t>The home page permits users to define investment tickers.  Modals are used if tickers cannot be found.</a:t>
             </a:r>
-            <a:endParaRPr lang="en-US" dirty="0"/>
+          </a:p>
+          <a:p>
+            <a:pPr marL="285750" marR="0" lvl="0" indent="-285750" algn="l" rtl="0">
+              <a:lnSpc>
+                <a:spcPct val="150000"/>
+              </a:lnSpc>
+              <a:spcBef>
+                <a:spcPts val="0"/>
+              </a:spcBef>
+              <a:spcAft>
+                <a:spcPts val="0"/>
+              </a:spcAft>
+              <a:buClr>
+                <a:srgbClr val="000000"/>
+              </a:buClr>
+              <a:buSzPts val="2800"/>
+              <a:buFont typeface="Wingdings" panose="05000000000000000000" pitchFamily="2" charset="2"/>
+              <a:buChar char="§"/>
+            </a:pPr>
+            <a:r>
+              <a:rPr lang="en-US" sz="1600" dirty="0"/>
+              <a:t>For each ticker, minimum and maximum values for characteristic parameters can be defined.</a:t>
+            </a:r>
+          </a:p>
+          <a:p>
+            <a:pPr marL="285750" marR="0" lvl="0" indent="-285750" algn="l" rtl="0">
+              <a:lnSpc>
+                <a:spcPct val="150000"/>
+              </a:lnSpc>
+              <a:spcBef>
+                <a:spcPts val="0"/>
+              </a:spcBef>
+              <a:spcAft>
+                <a:spcPts val="0"/>
+              </a:spcAft>
+              <a:buClr>
+                <a:srgbClr val="000000"/>
+              </a:buClr>
+              <a:buSzPts val="2800"/>
+              <a:buFont typeface="Wingdings" panose="05000000000000000000" pitchFamily="2" charset="2"/>
+              <a:buChar char="§"/>
+            </a:pPr>
+            <a:r>
+              <a:rPr lang="en-US" sz="1600" dirty="0"/>
+              <a:t>Ticker pricing (and other data) are periodically obtained and compared to the defined range.  Values outside of the desired range are noted for further investigation.</a:t>
+            </a:r>
+          </a:p>
+          <a:p>
+            <a:pPr marL="285750" marR="0" lvl="0" indent="-285750" algn="l" rtl="0">
+              <a:lnSpc>
+                <a:spcPct val="150000"/>
+              </a:lnSpc>
+              <a:spcBef>
+                <a:spcPts val="0"/>
+              </a:spcBef>
+              <a:spcAft>
+                <a:spcPts val="0"/>
+              </a:spcAft>
+              <a:buClr>
+                <a:srgbClr val="000000"/>
+              </a:buClr>
+              <a:buSzPts val="2800"/>
+              <a:buFont typeface="Wingdings" panose="05000000000000000000" pitchFamily="2" charset="2"/>
+              <a:buChar char="§"/>
+            </a:pPr>
+            <a:r>
+              <a:rPr lang="en-US" sz="1600" dirty="0"/>
+              <a:t>With each update from an API endpoint, all parameters are checked against their respective range.</a:t>
+            </a:r>
+          </a:p>
+          <a:p>
+            <a:pPr marL="285750" marR="0" lvl="0" indent="-285750" algn="l" rtl="0">
+              <a:lnSpc>
+                <a:spcPct val="150000"/>
+              </a:lnSpc>
+              <a:spcBef>
+                <a:spcPts val="0"/>
+              </a:spcBef>
+              <a:spcAft>
+                <a:spcPts val="0"/>
+              </a:spcAft>
+              <a:buClr>
+                <a:srgbClr val="000000"/>
+              </a:buClr>
+              <a:buSzPts val="2800"/>
+              <a:buFont typeface="Wingdings" panose="05000000000000000000" pitchFamily="2" charset="2"/>
+              <a:buChar char="§"/>
+            </a:pPr>
+            <a:r>
+              <a:rPr lang="en-US" sz="1600" dirty="0"/>
+              <a:t>Tickers, parameter ranges, and pricing is saved and retrieved to/from local storage.</a:t>
+            </a:r>
+          </a:p>
+          <a:p>
+            <a:pPr marL="285750" marR="0" lvl="0" indent="-285750" algn="l" rtl="0">
+              <a:lnSpc>
+                <a:spcPct val="150000"/>
+              </a:lnSpc>
+              <a:spcBef>
+                <a:spcPts val="0"/>
+              </a:spcBef>
+              <a:spcAft>
+                <a:spcPts val="0"/>
+              </a:spcAft>
+              <a:buClr>
+                <a:srgbClr val="000000"/>
+              </a:buClr>
+              <a:buSzPts val="2800"/>
+              <a:buFont typeface="Wingdings" panose="05000000000000000000" pitchFamily="2" charset="2"/>
+              <a:buChar char="§"/>
+            </a:pPr>
+            <a:r>
+              <a:rPr lang="en-US" sz="1600" dirty="0"/>
+              <a:t>Users can switch investment view from each detail page via a drop list.</a:t>
+            </a:r>
           </a:p>
           <a:p>
             <a:pPr marL="571500" lvl="3" indent="-285750">
@@ -16765,25 +17393,7 @@
               <a:buFont typeface="Arial" panose="020B0604020202020204" pitchFamily="34" charset="0"/>
               <a:buChar char="•"/>
             </a:pPr>
-            <a:r>
-              <a:rPr lang="en-US" dirty="0"/>
-              <a:t>Note that “equity data” (stocks) will not be updated during this live demo because the stock market is closed.</a:t>
-            </a:r>
-            <a:br>
-              <a:rPr lang="en-US" dirty="0"/>
-            </a:br>
             <a:endParaRPr lang="en-US" dirty="0"/>
-          </a:p>
-          <a:p>
-            <a:pPr marL="571500" lvl="3" indent="-285750">
-              <a:buSzPts val="2800"/>
-              <a:buFont typeface="Arial" panose="020B0604020202020204" pitchFamily="34" charset="0"/>
-              <a:buChar char="•"/>
-            </a:pPr>
-            <a:r>
-              <a:rPr lang="en-US" dirty="0"/>
-              <a:t>Crypto currencies will be updated live.</a:t>
-            </a:r>
           </a:p>
           <a:p>
             <a:pPr marL="285750" lvl="1">
@@ -16799,18 +17409,18 @@
     </p:spTree>
     <p:extLst>
       <p:ext uri="{BB962C8B-B14F-4D97-AF65-F5344CB8AC3E}">
-        <p14:creationId xmlns:p14="http://schemas.microsoft.com/office/powerpoint/2010/main" val="3819297045"/>
+        <p14:creationId xmlns:p14="http://schemas.microsoft.com/office/powerpoint/2010/main" val="4128781678"/>
       </p:ext>
     </p:extLst>
   </p:cSld>
   <p:clrMapOvr>
     <a:masterClrMapping/>
   </p:clrMapOvr>
-  <mc:AlternateContent xmlns:mc="http://schemas.openxmlformats.org/markup-compatibility/2006">
-    <mc:Choice xmlns:p14="http://schemas.microsoft.com/office/powerpoint/2010/main" Requires="p14">
+  <mc:AlternateContent xmlns:mc="http://schemas.openxmlformats.org/markup-compatibility/2006" xmlns:p14="http://schemas.microsoft.com/office/powerpoint/2010/main">
+    <mc:Choice Requires="p14">
       <p:transition spd="slow" p14:dur="2000" advClick="0"/>
     </mc:Choice>
-    <mc:Fallback>
+    <mc:Fallback xmlns="">
       <p:transition spd="slow" advClick="0"/>
     </mc:Fallback>
   </mc:AlternateContent>
@@ -16910,7 +17520,7 @@
                   <a:schemeClr val="lt1"/>
                 </a:solidFill>
               </a:rPr>
-              <a:t>Future Development</a:t>
+              <a:t>Application Demonstration</a:t>
             </a:r>
             <a:endParaRPr sz="3600" dirty="0"/>
           </a:p>
@@ -17031,7 +17641,7 @@
         <p:spPr>
           <a:xfrm>
             <a:off x="380999" y="1912882"/>
-            <a:ext cx="8382001" cy="4498935"/>
+            <a:ext cx="6240137" cy="4498935"/>
           </a:xfrm>
           <a:prstGeom prst="rect">
             <a:avLst/>
@@ -17048,6 +17658,9 @@
           <a:lstStyle/>
           <a:p>
             <a:pPr marL="285750" marR="0" lvl="0" indent="-285750" algn="l" rtl="0">
+              <a:lnSpc>
+                <a:spcPct val="200000"/>
+              </a:lnSpc>
               <a:spcBef>
                 <a:spcPts val="0"/>
               </a:spcBef>
@@ -17063,15 +17676,8 @@
             </a:pPr>
             <a:r>
               <a:rPr lang="en-US" sz="1600" dirty="0"/>
-              <a:t>This application can be improved for the next version by considering.</a:t>
+              <a:t>The demonstration:</a:t>
             </a:r>
-          </a:p>
-          <a:p>
-            <a:pPr marL="571500" lvl="3" indent="-285750">
-              <a:buSzPts val="2800"/>
-              <a:buFont typeface="Arial" panose="020B0604020202020204" pitchFamily="34" charset="0"/>
-              <a:buChar char="•"/>
-            </a:pPr>
             <a:endParaRPr lang="en-US" dirty="0"/>
           </a:p>
           <a:p>
@@ -17082,100 +17688,37 @@
             </a:pPr>
             <a:r>
               <a:rPr lang="en-US" dirty="0"/>
-              <a:t>Subscribing to “paid” APIs, which will remove (unlock) access restrictions.</a:t>
+              <a:t>Note that “equity data” (stocks) will not be updated during this live demo because the stock market is closed.</a:t>
             </a:r>
-          </a:p>
-          <a:p>
-            <a:pPr marL="822960" lvl="8" indent="-285750">
+            <a:br>
+              <a:rPr lang="en-US" dirty="0"/>
+            </a:br>
+            <a:endParaRPr lang="en-US" dirty="0"/>
+          </a:p>
+          <a:p>
+            <a:pPr marL="571500" lvl="3" indent="-285750">
               <a:buSzPts val="2800"/>
               <a:buFont typeface="Arial" panose="020B0604020202020204" pitchFamily="34" charset="0"/>
               <a:buChar char="•"/>
             </a:pPr>
             <a:r>
               <a:rPr lang="en-US" dirty="0"/>
-              <a:t>Additional calls to the same API can be made for additional data.</a:t>
+              <a:t>Crypto currencies will be updated live.</a:t>
             </a:r>
-          </a:p>
-          <a:p>
-            <a:pPr marL="822960" lvl="8" indent="-285750">
+            <a:br>
+              <a:rPr lang="en-US" dirty="0"/>
+            </a:br>
+            <a:endParaRPr lang="en-US" dirty="0"/>
+          </a:p>
+          <a:p>
+            <a:pPr marL="571500" lvl="3" indent="-285750">
               <a:buSzPts val="2800"/>
               <a:buFont typeface="Arial" panose="020B0604020202020204" pitchFamily="34" charset="0"/>
               <a:buChar char="•"/>
             </a:pPr>
             <a:r>
               <a:rPr lang="en-US" dirty="0"/>
-              <a:t>The update/refresh frequency can be increased.</a:t>
-            </a:r>
-          </a:p>
-          <a:p>
-            <a:pPr marL="822960" lvl="8" indent="-285750">
-              <a:buSzPts val="2800"/>
-              <a:buFont typeface="Arial" panose="020B0604020202020204" pitchFamily="34" charset="0"/>
-              <a:buChar char="•"/>
-            </a:pPr>
-            <a:r>
-              <a:rPr lang="en-US" dirty="0"/>
-              <a:t>More investments can be monitored</a:t>
-            </a:r>
-          </a:p>
-          <a:p>
-            <a:pPr marL="571500" lvl="1" indent="-285750">
-              <a:buSzPts val="2800"/>
-              <a:buFont typeface="Arial" panose="020B0604020202020204" pitchFamily="34" charset="0"/>
-              <a:buChar char="•"/>
-            </a:pPr>
-            <a:endParaRPr lang="en-US" dirty="0"/>
-          </a:p>
-          <a:p>
-            <a:pPr marL="571500" lvl="1" indent="-285750">
-              <a:buSzPts val="2800"/>
-              <a:buFont typeface="Arial" panose="020B0604020202020204" pitchFamily="34" charset="0"/>
-              <a:buChar char="•"/>
-            </a:pPr>
-            <a:r>
-              <a:rPr lang="en-US" dirty="0"/>
-              <a:t>Using technologies other than APIs (custom widgets offered by some web sites.</a:t>
-            </a:r>
-          </a:p>
-          <a:p>
-            <a:pPr marL="822960" lvl="1" indent="-285750">
-              <a:buSzPts val="2800"/>
-              <a:buFont typeface="Arial" panose="020B0604020202020204" pitchFamily="34" charset="0"/>
-              <a:buChar char="•"/>
-            </a:pPr>
-            <a:r>
-              <a:rPr lang="en-US" dirty="0"/>
-              <a:t>Widgets can provide additional data not available in the public APIs.</a:t>
-            </a:r>
-            <a:br>
-              <a:rPr lang="en-US" dirty="0"/>
-            </a:br>
-            <a:endParaRPr lang="en-US" dirty="0"/>
-          </a:p>
-          <a:p>
-            <a:pPr marL="571500" lvl="1" indent="-285750">
-              <a:buSzPts val="2800"/>
-              <a:buFont typeface="Arial" panose="020B0604020202020204" pitchFamily="34" charset="0"/>
-              <a:buChar char="•"/>
-            </a:pPr>
-            <a:r>
-              <a:rPr lang="en-US" dirty="0"/>
-              <a:t>Other investments outside of equities and crypto currencies can be added for monitoring.</a:t>
-            </a:r>
-            <a:br>
-              <a:rPr lang="en-US" dirty="0"/>
-            </a:br>
-            <a:endParaRPr lang="en-US" dirty="0"/>
-          </a:p>
-          <a:p>
-            <a:pPr marL="571500" lvl="1" indent="-285750">
-              <a:buSzPts val="2800"/>
-              <a:buFont typeface="Arial" panose="020B0604020202020204" pitchFamily="34" charset="0"/>
-              <a:buChar char="•"/>
-            </a:pPr>
-            <a:r>
-              <a:rPr lang="en-US" dirty="0"/>
-              <a:t>Back-end technologies can be used to actually alert the user when a monitored parameter moves out of the desired range.</a:t>
+              <a:t>Investment tickers are saved and retrieved to/from local storage.</a:t>
             </a:r>
           </a:p>
           <a:p>
@@ -17189,68 +17732,21 @@
           </a:p>
         </p:txBody>
       </p:sp>
-      <p:pic>
-        <p:nvPicPr>
-          <p:cNvPr id="3" name="Picture 4" descr="Image result for data privacy">
-            <a:extLst>
-              <a:ext uri="{FF2B5EF4-FFF2-40B4-BE49-F238E27FC236}">
-                <a16:creationId xmlns:a16="http://schemas.microsoft.com/office/drawing/2014/main" id="{7E8E335A-77D6-47C3-988C-A7CABB9F7537}"/>
-              </a:ext>
-            </a:extLst>
-          </p:cNvPr>
-          <p:cNvPicPr>
-            <a:picLocks noChangeAspect="1" noChangeArrowheads="1"/>
-          </p:cNvPicPr>
-          <p:nvPr/>
-        </p:nvPicPr>
-        <p:blipFill>
-          <a:blip r:embed="rId3">
-            <a:extLst>
-              <a:ext uri="{28A0092B-C50C-407E-A947-70E740481C1C}">
-                <a14:useLocalDpi xmlns:a14="http://schemas.microsoft.com/office/drawing/2010/main" val="0"/>
-              </a:ext>
-            </a:extLst>
-          </a:blip>
-          <a:srcRect/>
-          <a:stretch>
-            <a:fillRect/>
-          </a:stretch>
-        </p:blipFill>
-        <p:spPr bwMode="auto">
-          <a:xfrm>
-            <a:off x="3881071" y="4940300"/>
-            <a:ext cx="2619375" cy="1743075"/>
-          </a:xfrm>
-          <a:prstGeom prst="rect">
-            <a:avLst/>
-          </a:prstGeom>
-          <a:noFill/>
-          <a:extLst>
-            <a:ext uri="{909E8E84-426E-40DD-AFC4-6F175D3DCCD1}">
-              <a14:hiddenFill xmlns:a14="http://schemas.microsoft.com/office/drawing/2010/main">
-                <a:solidFill>
-                  <a:srgbClr val="FFFFFF"/>
-                </a:solidFill>
-              </a14:hiddenFill>
-            </a:ext>
-          </a:extLst>
-        </p:spPr>
-      </p:pic>
     </p:spTree>
     <p:extLst>
       <p:ext uri="{BB962C8B-B14F-4D97-AF65-F5344CB8AC3E}">
-        <p14:creationId xmlns:p14="http://schemas.microsoft.com/office/powerpoint/2010/main" val="743924951"/>
+        <p14:creationId xmlns:p14="http://schemas.microsoft.com/office/powerpoint/2010/main" val="3819297045"/>
       </p:ext>
     </p:extLst>
   </p:cSld>
   <p:clrMapOvr>
     <a:masterClrMapping/>
   </p:clrMapOvr>
-  <mc:AlternateContent xmlns:mc="http://schemas.openxmlformats.org/markup-compatibility/2006">
-    <mc:Choice xmlns:p14="http://schemas.microsoft.com/office/powerpoint/2010/main" Requires="p14">
+  <mc:AlternateContent xmlns:mc="http://schemas.openxmlformats.org/markup-compatibility/2006" xmlns:p14="http://schemas.microsoft.com/office/powerpoint/2010/main">
+    <mc:Choice Requires="p14">
       <p:transition spd="slow" p14:dur="2000" advClick="0"/>
     </mc:Choice>
-    <mc:Fallback>
+    <mc:Fallback xmlns="">
       <p:transition spd="slow" advClick="0"/>
     </mc:Fallback>
   </mc:AlternateContent>
@@ -17350,7 +17846,7 @@
                   <a:schemeClr val="lt1"/>
                 </a:solidFill>
               </a:rPr>
-              <a:t>Important Links</a:t>
+              <a:t>Future Development</a:t>
             </a:r>
             <a:endParaRPr sz="3600" dirty="0"/>
           </a:p>
@@ -17471,7 +17967,7 @@
         <p:spPr>
           <a:xfrm>
             <a:off x="380999" y="1912882"/>
-            <a:ext cx="6240137" cy="4498935"/>
+            <a:ext cx="6090139" cy="4498935"/>
           </a:xfrm>
           <a:prstGeom prst="rect">
             <a:avLst/>
@@ -17487,10 +17983,7 @@
           </a:bodyPr>
           <a:lstStyle/>
           <a:p>
-            <a:pPr marL="285750" marR="0" lvl="0" indent="-285750" algn="l" rtl="0">
-              <a:lnSpc>
-                <a:spcPct val="200000"/>
-              </a:lnSpc>
+            <a:pPr marR="0" lvl="0" algn="l" rtl="0">
               <a:spcBef>
                 <a:spcPts val="0"/>
               </a:spcBef>
@@ -17501,12 +17994,10 @@
                 <a:srgbClr val="000000"/>
               </a:buClr>
               <a:buSzPts val="2800"/>
-              <a:buFont typeface="Wingdings" panose="05000000000000000000" pitchFamily="2" charset="2"/>
-              <a:buChar char="§"/>
             </a:pPr>
             <a:r>
-              <a:rPr lang="en-US" sz="1800" dirty="0"/>
-              <a:t>Link to deployed application:</a:t>
+              <a:rPr lang="en-US" sz="1600" dirty="0"/>
+              <a:t>This application can be improved for the next version by considering.</a:t>
             </a:r>
           </a:p>
           <a:p>
@@ -17515,7 +18006,7 @@
               <a:buFont typeface="Arial" panose="020B0604020202020204" pitchFamily="34" charset="0"/>
               <a:buChar char="•"/>
             </a:pPr>
-            <a:endParaRPr lang="en-US" sz="1800" dirty="0"/>
+            <a:endParaRPr lang="en-US" dirty="0"/>
           </a:p>
           <a:p>
             <a:pPr marL="571500" lvl="3" indent="-285750">
@@ -17524,33 +18015,41 @@
               <a:buChar char="•"/>
             </a:pPr>
             <a:r>
-              <a:rPr lang="en-US" sz="1800" b="0" i="0" u="none" strike="noStrike" dirty="0">
-                <a:solidFill>
-                  <a:srgbClr val="0366D6"/>
-                </a:solidFill>
-                <a:effectLst/>
-                <a:latin typeface="-apple-system"/>
-                <a:hlinkClick r:id="rId3"/>
-              </a:rPr>
-              <a:t>https://team-antman-project-1.github.io/stockman/</a:t>
+              <a:rPr lang="en-US" dirty="0"/>
+              <a:t>Subscribing to “paid” APIs, which will remove (unlock) access restrictions.</a:t>
             </a:r>
-            <a:br>
-              <a:rPr lang="en-US" sz="1800" dirty="0"/>
-            </a:br>
-            <a:endParaRPr lang="en-US" sz="1800" dirty="0"/>
-          </a:p>
-          <a:p>
-            <a:pPr marL="285750" indent="-285750">
-              <a:lnSpc>
-                <a:spcPct val="200000"/>
-              </a:lnSpc>
+          </a:p>
+          <a:p>
+            <a:pPr marL="822960" lvl="8" indent="-285750">
               <a:buSzPts val="2800"/>
-              <a:buFont typeface="Wingdings" panose="05000000000000000000" pitchFamily="2" charset="2"/>
-              <a:buChar char="§"/>
+              <a:buFont typeface="Arial" panose="020B0604020202020204" pitchFamily="34" charset="0"/>
+              <a:buChar char="•"/>
             </a:pPr>
             <a:r>
-              <a:rPr lang="en-US" sz="1800" dirty="0"/>
-              <a:t>Link to GitHub Repository:</a:t>
+              <a:rPr lang="en-US" dirty="0"/>
+              <a:t>Additional calls to the same API can be made for additional data.</a:t>
+            </a:r>
+          </a:p>
+          <a:p>
+            <a:pPr marL="822960" lvl="8" indent="-285750">
+              <a:buSzPts val="2800"/>
+              <a:buFont typeface="Arial" panose="020B0604020202020204" pitchFamily="34" charset="0"/>
+              <a:buChar char="•"/>
+            </a:pPr>
+            <a:r>
+              <a:rPr lang="en-US" dirty="0"/>
+              <a:t>The update/refresh frequency can be increased.</a:t>
+            </a:r>
+          </a:p>
+          <a:p>
+            <a:pPr marL="822960" lvl="8" indent="-285750">
+              <a:buSzPts val="2800"/>
+              <a:buFont typeface="Arial" panose="020B0604020202020204" pitchFamily="34" charset="0"/>
+              <a:buChar char="•"/>
+            </a:pPr>
+            <a:r>
+              <a:rPr lang="en-US" dirty="0"/>
+              <a:t>More investments can be monitored</a:t>
             </a:r>
           </a:p>
           <a:p>
@@ -17559,7 +18058,7 @@
               <a:buFont typeface="Arial" panose="020B0604020202020204" pitchFamily="34" charset="0"/>
               <a:buChar char="•"/>
             </a:pPr>
-            <a:endParaRPr lang="en-US" sz="1800" dirty="0"/>
+            <a:endParaRPr lang="en-US" dirty="0"/>
           </a:p>
           <a:p>
             <a:pPr marL="571500" lvl="1" indent="-285750">
@@ -17568,18 +18067,49 @@
               <a:buChar char="•"/>
             </a:pPr>
             <a:r>
-              <a:rPr lang="en-US" sz="1800" dirty="0">
-                <a:hlinkClick r:id="rId4"/>
-              </a:rPr>
-              <a:t>https://github.com/Team-Antman-Project-1/stockman</a:t>
+              <a:rPr lang="en-US" dirty="0"/>
+              <a:t>Using technologies other than APIs (custom widgets offered by some web sites.</a:t>
             </a:r>
-            <a:r>
-              <a:rPr lang="en-US" sz="1800" dirty="0"/>
-              <a:t> </a:t>
-            </a:r>
+          </a:p>
+          <a:p>
+            <a:pPr marL="822960" lvl="1" indent="-285750">
+              <a:buSzPts val="2800"/>
+              <a:buFont typeface="Arial" panose="020B0604020202020204" pitchFamily="34" charset="0"/>
+              <a:buChar char="•"/>
+            </a:pPr>
             <a:r>
               <a:rPr lang="en-US" dirty="0"/>
-              <a:t>.</a:t>
+              <a:t>Widgets can provide additional data not available in the public APIs.</a:t>
+            </a:r>
+            <a:br>
+              <a:rPr lang="en-US" dirty="0"/>
+            </a:br>
+            <a:endParaRPr lang="en-US" dirty="0"/>
+          </a:p>
+          <a:p>
+            <a:pPr marL="571500" lvl="1" indent="-285750">
+              <a:buSzPts val="2800"/>
+              <a:buFont typeface="Arial" panose="020B0604020202020204" pitchFamily="34" charset="0"/>
+              <a:buChar char="•"/>
+            </a:pPr>
+            <a:r>
+              <a:rPr lang="en-US" dirty="0"/>
+              <a:t>Other investments outside of equities and crypto currencies can be added for monitoring.</a:t>
+            </a:r>
+            <a:br>
+              <a:rPr lang="en-US" dirty="0"/>
+            </a:br>
+            <a:endParaRPr lang="en-US" dirty="0"/>
+          </a:p>
+          <a:p>
+            <a:pPr marL="571500" lvl="1" indent="-285750">
+              <a:buSzPts val="2800"/>
+              <a:buFont typeface="Arial" panose="020B0604020202020204" pitchFamily="34" charset="0"/>
+              <a:buChar char="•"/>
+            </a:pPr>
+            <a:r>
+              <a:rPr lang="en-US" dirty="0"/>
+              <a:t>Back-end technologies can be used to actually alert the user when a monitored parameter moves out of the desired range, without active monitoring of the browser window.</a:t>
             </a:r>
           </a:p>
           <a:p>
@@ -17593,21 +18123,68 @@
           </a:p>
         </p:txBody>
       </p:sp>
+      <p:pic>
+        <p:nvPicPr>
+          <p:cNvPr id="3" name="Picture 4" descr="Image result for data privacy">
+            <a:extLst>
+              <a:ext uri="{FF2B5EF4-FFF2-40B4-BE49-F238E27FC236}">
+                <a16:creationId xmlns:a16="http://schemas.microsoft.com/office/drawing/2014/main" id="{7E8E335A-77D6-47C3-988C-A7CABB9F7537}"/>
+              </a:ext>
+            </a:extLst>
+          </p:cNvPr>
+          <p:cNvPicPr>
+            <a:picLocks noChangeAspect="1" noChangeArrowheads="1"/>
+          </p:cNvPicPr>
+          <p:nvPr/>
+        </p:nvPicPr>
+        <p:blipFill>
+          <a:blip r:embed="rId3">
+            <a:extLst>
+              <a:ext uri="{28A0092B-C50C-407E-A947-70E740481C1C}">
+                <a14:useLocalDpi xmlns:a14="http://schemas.microsoft.com/office/drawing/2010/main" val="0"/>
+              </a:ext>
+            </a:extLst>
+          </a:blip>
+          <a:srcRect/>
+          <a:stretch>
+            <a:fillRect/>
+          </a:stretch>
+        </p:blipFill>
+        <p:spPr bwMode="auto">
+          <a:xfrm>
+            <a:off x="6664570" y="3391241"/>
+            <a:ext cx="2174631" cy="1447118"/>
+          </a:xfrm>
+          <a:prstGeom prst="rect">
+            <a:avLst/>
+          </a:prstGeom>
+          <a:noFill/>
+          <a:extLst>
+            <a:ext uri="{909E8E84-426E-40DD-AFC4-6F175D3DCCD1}">
+              <a14:hiddenFill xmlns:a14="http://schemas.microsoft.com/office/drawing/2010/main">
+                <a:solidFill>
+                  <a:srgbClr val="FFFFFF"/>
+                </a:solidFill>
+              </a14:hiddenFill>
+            </a:ext>
+          </a:extLst>
+        </p:spPr>
+      </p:pic>
     </p:spTree>
     <p:extLst>
       <p:ext uri="{BB962C8B-B14F-4D97-AF65-F5344CB8AC3E}">
-        <p14:creationId xmlns:p14="http://schemas.microsoft.com/office/powerpoint/2010/main" val="462138451"/>
+        <p14:creationId xmlns:p14="http://schemas.microsoft.com/office/powerpoint/2010/main" val="743924951"/>
       </p:ext>
     </p:extLst>
   </p:cSld>
   <p:clrMapOvr>
     <a:masterClrMapping/>
   </p:clrMapOvr>
-  <mc:AlternateContent xmlns:mc="http://schemas.openxmlformats.org/markup-compatibility/2006">
-    <mc:Choice xmlns:p14="http://schemas.microsoft.com/office/powerpoint/2010/main" Requires="p14">
+  <mc:AlternateContent xmlns:mc="http://schemas.openxmlformats.org/markup-compatibility/2006" xmlns:p14="http://schemas.microsoft.com/office/powerpoint/2010/main">
+    <mc:Choice Requires="p14">
       <p:transition spd="slow" p14:dur="2000" advClick="0"/>
     </mc:Choice>
-    <mc:Fallback>
+    <mc:Fallback xmlns="">
       <p:transition spd="slow" advClick="0"/>
     </mc:Fallback>
   </mc:AlternateContent>
@@ -17707,7 +18284,7 @@
                   <a:schemeClr val="lt1"/>
                 </a:solidFill>
               </a:rPr>
-              <a:t>Questions</a:t>
+              <a:t>Important Links</a:t>
             </a:r>
             <a:endParaRPr sz="3600" dirty="0"/>
           </a:p>
@@ -17827,8 +18404,8 @@
         </p:nvSpPr>
         <p:spPr>
           <a:xfrm>
-            <a:off x="380999" y="1912883"/>
-            <a:ext cx="4762501" cy="1664708"/>
+            <a:off x="380999" y="1912882"/>
+            <a:ext cx="6240137" cy="4498935"/>
           </a:xfrm>
           <a:prstGeom prst="rect">
             <a:avLst/>
@@ -17863,13 +18440,34 @@
             </a:pPr>
             <a:r>
               <a:rPr lang="en-US" sz="1800" dirty="0"/>
-              <a:t>Thank you for watching this presentation.</a:t>
+              <a:t>Link to deployed application:</a:t>
             </a:r>
           </a:p>
           <a:p>
-            <a:pPr marL="285750" lvl="3">
+            <a:pPr marL="571500" lvl="3" indent="-285750">
               <a:buSzPts val="2800"/>
+              <a:buFont typeface="Arial" panose="020B0604020202020204" pitchFamily="34" charset="0"/>
+              <a:buChar char="•"/>
             </a:pPr>
+            <a:endParaRPr lang="en-US" sz="1800" dirty="0"/>
+          </a:p>
+          <a:p>
+            <a:pPr marL="571500" lvl="3" indent="-285750">
+              <a:buSzPts val="2800"/>
+              <a:buFont typeface="Arial" panose="020B0604020202020204" pitchFamily="34" charset="0"/>
+              <a:buChar char="•"/>
+            </a:pPr>
+            <a:r>
+              <a:rPr lang="en-US" sz="1800" b="0" i="0" u="none" strike="noStrike" dirty="0">
+                <a:solidFill>
+                  <a:srgbClr val="0366D6"/>
+                </a:solidFill>
+                <a:effectLst/>
+                <a:latin typeface="-apple-system"/>
+                <a:hlinkClick r:id="rId3"/>
+              </a:rPr>
+              <a:t>https://team-antman-project-1.github.io/stockman/</a:t>
+            </a:r>
             <a:br>
               <a:rPr lang="en-US" sz="1800" dirty="0"/>
             </a:br>
@@ -17886,9 +18484,37 @@
             </a:pPr>
             <a:r>
               <a:rPr lang="en-US" sz="1800" dirty="0"/>
-              <a:t>Questions ?</a:t>
+              <a:t>Link to GitHub Repository:</a:t>
             </a:r>
-            <a:endParaRPr lang="en-US" dirty="0"/>
+          </a:p>
+          <a:p>
+            <a:pPr marL="571500" lvl="1" indent="-285750">
+              <a:buSzPts val="2800"/>
+              <a:buFont typeface="Arial" panose="020B0604020202020204" pitchFamily="34" charset="0"/>
+              <a:buChar char="•"/>
+            </a:pPr>
+            <a:endParaRPr lang="en-US" sz="1800" dirty="0"/>
+          </a:p>
+          <a:p>
+            <a:pPr marL="571500" lvl="1" indent="-285750">
+              <a:buSzPts val="2800"/>
+              <a:buFont typeface="Arial" panose="020B0604020202020204" pitchFamily="34" charset="0"/>
+              <a:buChar char="•"/>
+            </a:pPr>
+            <a:r>
+              <a:rPr lang="en-US" sz="1800" dirty="0">
+                <a:hlinkClick r:id="rId4"/>
+              </a:rPr>
+              <a:t>https://github.com/Team-Antman-Project-1/stockman</a:t>
+            </a:r>
+            <a:r>
+              <a:rPr lang="en-US" sz="1800" dirty="0"/>
+              <a:t> </a:t>
+            </a:r>
+            <a:r>
+              <a:rPr lang="en-US" dirty="0"/>
+              <a:t>.</a:t>
+            </a:r>
           </a:p>
           <a:p>
             <a:pPr marL="285750" lvl="1">
@@ -17901,68 +18527,21 @@
           </a:p>
         </p:txBody>
       </p:sp>
-      <p:pic>
-        <p:nvPicPr>
-          <p:cNvPr id="2054" name="Picture 6" descr="Free Question Mark Emoji Png, Download Free Clip Art, Free Clip Art on  Clipart Library">
-            <a:extLst>
-              <a:ext uri="{FF2B5EF4-FFF2-40B4-BE49-F238E27FC236}">
-                <a16:creationId xmlns:a16="http://schemas.microsoft.com/office/drawing/2014/main" id="{2B6F8239-4EB6-44D1-9B45-2C378A2A8344}"/>
-              </a:ext>
-            </a:extLst>
-          </p:cNvPr>
-          <p:cNvPicPr>
-            <a:picLocks noChangeAspect="1" noChangeArrowheads="1"/>
-          </p:cNvPicPr>
-          <p:nvPr/>
-        </p:nvPicPr>
-        <p:blipFill>
-          <a:blip r:embed="rId3">
-            <a:extLst>
-              <a:ext uri="{28A0092B-C50C-407E-A947-70E740481C1C}">
-                <a14:useLocalDpi xmlns:a14="http://schemas.microsoft.com/office/drawing/2010/main" val="0"/>
-              </a:ext>
-            </a:extLst>
-          </a:blip>
-          <a:srcRect/>
-          <a:stretch>
-            <a:fillRect/>
-          </a:stretch>
-        </p:blipFill>
-        <p:spPr bwMode="auto">
-          <a:xfrm>
-            <a:off x="3607434" y="3022282"/>
-            <a:ext cx="3345815" cy="3345815"/>
-          </a:xfrm>
-          <a:prstGeom prst="rect">
-            <a:avLst/>
-          </a:prstGeom>
-          <a:noFill/>
-          <a:extLst>
-            <a:ext uri="{909E8E84-426E-40DD-AFC4-6F175D3DCCD1}">
-              <a14:hiddenFill xmlns:a14="http://schemas.microsoft.com/office/drawing/2010/main">
-                <a:solidFill>
-                  <a:srgbClr val="FFFFFF"/>
-                </a:solidFill>
-              </a14:hiddenFill>
-            </a:ext>
-          </a:extLst>
-        </p:spPr>
-      </p:pic>
     </p:spTree>
     <p:extLst>
       <p:ext uri="{BB962C8B-B14F-4D97-AF65-F5344CB8AC3E}">
-        <p14:creationId xmlns:p14="http://schemas.microsoft.com/office/powerpoint/2010/main" val="907269978"/>
+        <p14:creationId xmlns:p14="http://schemas.microsoft.com/office/powerpoint/2010/main" val="462138451"/>
       </p:ext>
     </p:extLst>
   </p:cSld>
   <p:clrMapOvr>
     <a:masterClrMapping/>
   </p:clrMapOvr>
-  <mc:AlternateContent xmlns:mc="http://schemas.openxmlformats.org/markup-compatibility/2006">
-    <mc:Choice xmlns:p14="http://schemas.microsoft.com/office/powerpoint/2010/main" Requires="p14">
+  <mc:AlternateContent xmlns:mc="http://schemas.openxmlformats.org/markup-compatibility/2006" xmlns:p14="http://schemas.microsoft.com/office/powerpoint/2010/main">
+    <mc:Choice Requires="p14">
       <p:transition spd="slow" p14:dur="2000" advClick="0"/>
     </mc:Choice>
-    <mc:Fallback>
+    <mc:Fallback xmlns="">
       <p:transition spd="slow" advClick="0"/>
     </mc:Fallback>
   </mc:AlternateContent>

</xml_diff>

<commit_message>
Added functions to check for duplicate tickers, updated 'readme' and 'PPTx'
</commit_message>
<xml_diff>
--- a/artifacts/Stockman-Presentation.pptx
+++ b/artifacts/Stockman-Presentation.pptx
@@ -2328,7 +2328,38 @@
                 <a:cs typeface="Times New Roman"/>
                 <a:sym typeface="Times New Roman"/>
               </a:rPr>
-              <a:t>This slide discusses ideas and improvements that could be made in a future version of the application</a:t>
+              <a:t>This slide discusses ideas and improvements that could be made in a future version of the application.</a:t>
+            </a:r>
+          </a:p>
+          <a:p>
+            <a:pPr marL="457200" lvl="0" indent="-317500" algn="l" rtl="0">
+              <a:lnSpc>
+                <a:spcPct val="100000"/>
+              </a:lnSpc>
+              <a:spcBef>
+                <a:spcPts val="0"/>
+              </a:spcBef>
+              <a:spcAft>
+                <a:spcPts val="0"/>
+              </a:spcAft>
+              <a:buSzPts val="1400"/>
+              <a:buFont typeface="Times New Roman"/>
+              <a:buChar char="●"/>
+            </a:pPr>
+            <a:r>
+              <a:rPr lang="en-US" sz="1400" dirty="0">
+                <a:solidFill>
+                  <a:srgbClr val="111111"/>
+                </a:solidFill>
+                <a:highlight>
+                  <a:srgbClr val="FFFFFF"/>
+                </a:highlight>
+                <a:latin typeface="Times New Roman"/>
+                <a:ea typeface="Times New Roman"/>
+                <a:cs typeface="Times New Roman"/>
+                <a:sym typeface="Times New Roman"/>
+              </a:rPr>
+              <a:t>FinancialModelingPrep.com was initially used to obtain the Market Indexes, but this API has a limit of 250 calls total for a free account.  Market indexes were removed from the application due to this restriction.</a:t>
             </a:r>
             <a:endParaRPr sz="1400" dirty="0">
               <a:solidFill>
@@ -16817,7 +16848,7 @@
         <p:spPr>
           <a:xfrm>
             <a:off x="380999" y="1912882"/>
-            <a:ext cx="8382001" cy="4498935"/>
+            <a:ext cx="8382001" cy="4640318"/>
           </a:xfrm>
           <a:prstGeom prst="rect">
             <a:avLst/>
@@ -16914,7 +16945,7 @@
             </a:pPr>
             <a:r>
               <a:rPr lang="en-US" dirty="0"/>
-              <a:t>- FinancialModelingPrep.com	- nomics.com</a:t>
+              <a:t>- Nomics.com	</a:t>
             </a:r>
             <a:br>
               <a:rPr lang="en-US" dirty="0"/>
@@ -16929,7 +16960,7 @@
             </a:pPr>
             <a:r>
               <a:rPr lang="en-US" sz="1600" dirty="0"/>
-              <a:t>Project roles: Tony &amp; Rich worked on each project component together.  We did individually initiate different parts of the project: (Tony – HTML &amp; CSS, Rich – JavaScript, Git Issues, and documentation).</a:t>
+              <a:t>Project roles: Tony &amp; Rich worked on each project component together.  We did individually initiate different parts of the project: (Tony – HTML &amp; CSS, Rich – JavaScript, Git Issues, and documentation).  Later we both worked on each component as the need arose.</a:t>
             </a:r>
             <a:br>
               <a:rPr lang="en-US" sz="1600" dirty="0"/>
@@ -17009,11 +17040,11 @@
   <p:clrMapOvr>
     <a:masterClrMapping/>
   </p:clrMapOvr>
-  <mc:AlternateContent xmlns:mc="http://schemas.openxmlformats.org/markup-compatibility/2006">
-    <mc:Choice xmlns:p14="http://schemas.microsoft.com/office/powerpoint/2010/main" Requires="p14">
+  <mc:AlternateContent xmlns:mc="http://schemas.openxmlformats.org/markup-compatibility/2006" xmlns:p14="http://schemas.microsoft.com/office/powerpoint/2010/main">
+    <mc:Choice Requires="p14">
       <p:transition spd="slow" p14:dur="2000" advClick="0"/>
     </mc:Choice>
-    <mc:Fallback>
+    <mc:Fallback xmlns="">
       <p:transition spd="slow" advClick="0"/>
     </mc:Fallback>
   </mc:AlternateContent>
@@ -17361,7 +17392,7 @@
             </a:pPr>
             <a:r>
               <a:rPr lang="en-US" sz="1600" dirty="0"/>
-              <a:t>Tickers, parameter ranges, and pricing is saved and retrieved to/from local storage.</a:t>
+              <a:t>Tickers, parameter ranges, and pricing are saved and retrieved to/from local storage.</a:t>
             </a:r>
           </a:p>
           <a:p>
@@ -17384,7 +17415,7 @@
             </a:pPr>
             <a:r>
               <a:rPr lang="en-US" sz="1600" dirty="0"/>
-              <a:t>Users can switch investment view from each detail page via a drop list.</a:t>
+              <a:t>Users can switch investment views from each detail page via a drop list.</a:t>
             </a:r>
           </a:p>
           <a:p>

</xml_diff>

<commit_message>
Updates to PPTx and presentation script
</commit_message>
<xml_diff>
--- a/artifacts/Stockman-Presentation.pptx
+++ b/artifacts/Stockman-Presentation.pptx
@@ -14561,7 +14561,7 @@
         </p:nvSpPr>
         <p:spPr>
           <a:xfrm>
-            <a:off x="4800600" y="3276600"/>
+            <a:off x="4800600" y="3390900"/>
             <a:ext cx="3955180" cy="3048000"/>
           </a:xfrm>
           <a:prstGeom prst="rect">
@@ -14824,7 +14824,7 @@
         </p:nvSpPr>
         <p:spPr>
           <a:xfrm>
-            <a:off x="381000" y="3276600"/>
+            <a:off x="381000" y="3390900"/>
             <a:ext cx="4038600" cy="3048000"/>
           </a:xfrm>
           <a:prstGeom prst="rect">
@@ -14959,7 +14959,7 @@
                 <a:cs typeface="Calibri"/>
                 <a:sym typeface="Calibri"/>
               </a:rPr>
-              <a:t>Richard </a:t>
+              <a:t>Instructor: Richard </a:t>
             </a:r>
             <a:r>
               <a:rPr lang="en-US" sz="2400" b="0" i="0" u="none" strike="noStrike" cap="none" dirty="0" err="1">
@@ -16148,7 +16148,7 @@
             </a:pPr>
             <a:r>
               <a:rPr lang="en-US" sz="1800" dirty="0"/>
-              <a:t>As an investor, a want an efficient way to monitor my investments without logging onto a brokerage website.  I want to specify a list of important investments with minimum and maximum values for key parameters, and have an application (running on my phone or tablet) indicate when an investment value moves outside this range.  I can then pursue further research on a full service brokerage site.</a:t>
+              <a:t>As an investor, I want an efficient way to monitor my investments without logging onto a brokerage website.  I want to specify a list of important investments with minimum and maximum values for key parameters, and have an application (running on my phone or tablet) indicate when an investment value moves outside this range.  I can then pursue further research on a full service brokerage site.</a:t>
             </a:r>
             <a:endParaRPr sz="1800" dirty="0"/>
           </a:p>
@@ -17300,7 +17300,7 @@
             </a:pPr>
             <a:r>
               <a:rPr lang="en-US" sz="1600" dirty="0"/>
-              <a:t>The home page permits users to define investment tickers.  Modals are used if tickers cannot be found.</a:t>
+              <a:t>The home page permits users to define investment tickers.  Modals are used if tickers cannot be found, and for the parameter range definitions.</a:t>
             </a:r>
           </a:p>
           <a:p>

</xml_diff>